<commit_message>
la till namn i fil
</commit_message>
<xml_diff>
--- a/Workshop 1 Grade 3 .pptx
+++ b/Workshop 1 Grade 3 .pptx
@@ -4112,7 +4112,7 @@
         </p:nvSpPr>
         <p:spPr>
           <a:xfrm>
-            <a:off x="2603733" y="7631251"/>
+            <a:off x="335693" y="7453079"/>
             <a:ext cx="7776864" cy="3170099"/>
           </a:xfrm>
           <a:prstGeom prst="rect">
@@ -4128,21 +4128,13 @@
           <a:p>
             <a:r>
               <a:rPr lang="sv-SE" sz="2000" dirty="0" smtClean="0"/>
-              <a:t>1. Bröt </a:t>
-            </a:r>
+              <a:t>1. Bröt ut kalender och händelser, det va otydligt vem som hade tillåtelse till vad.</a:t>
+            </a:r>
+          </a:p>
+          <a:p>
             <a:r>
               <a:rPr lang="sv-SE" sz="2000" dirty="0" smtClean="0"/>
-              <a:t>ut kalender och händelser, det va otydligt vem som hade tillåtelse till vad.</a:t>
-            </a:r>
-          </a:p>
-          <a:p>
-            <a:r>
-              <a:rPr lang="sv-SE" sz="2000" dirty="0" smtClean="0"/>
-              <a:t>Nu har alla tillåtelse till kalendern och vem som får göra vad hanteras i kalendern</a:t>
-            </a:r>
-            <a:r>
-              <a:rPr lang="sv-SE" sz="2000" dirty="0" smtClean="0"/>
-              <a:t>.</a:t>
+              <a:t>Nu har alla tillåtelse till kalendern och vem som får göra vad hanteras i kalendern.</a:t>
             </a:r>
           </a:p>
           <a:p>
@@ -4192,7 +4184,6 @@
               <a:rPr lang="sv-SE" sz="2400" dirty="0" smtClean="0"/>
               <a:t>Innehåller</a:t>
             </a:r>
-            <a:endParaRPr lang="sv-SE" sz="2400" dirty="0" smtClean="0"/>
           </a:p>
         </p:txBody>
       </p:sp>
@@ -4252,7 +4243,43 @@
               <a:rPr lang="sv-SE" sz="2400" dirty="0" smtClean="0"/>
               <a:t>Äger</a:t>
             </a:r>
-            <a:endParaRPr lang="sv-SE" sz="2400" dirty="0" smtClean="0"/>
+          </a:p>
+        </p:txBody>
+      </p:sp>
+      <p:sp>
+        <p:nvSpPr>
+          <p:cNvPr id="2" name="TextBox 1"/>
+          <p:cNvSpPr txBox="1"/>
+          <p:nvPr/>
+        </p:nvSpPr>
+        <p:spPr>
+          <a:xfrm>
+            <a:off x="9685163" y="9865171"/>
+            <a:ext cx="2724096" cy="646331"/>
+          </a:xfrm>
+          <a:prstGeom prst="rect">
+            <a:avLst/>
+          </a:prstGeom>
+          <a:noFill/>
+        </p:spPr>
+        <p:txBody>
+          <a:bodyPr wrap="square" rtlCol="0">
+            <a:spAutoFit/>
+          </a:bodyPr>
+          <a:lstStyle/>
+          <a:p>
+            <a:r>
+              <a:rPr lang="sv-SE" dirty="0" smtClean="0"/>
+              <a:t>Kevin Madsen km222ew</a:t>
+            </a:r>
+            <a:br>
+              <a:rPr lang="sv-SE" dirty="0" smtClean="0"/>
+            </a:br>
+            <a:r>
+              <a:rPr lang="sv-SE" dirty="0" smtClean="0"/>
+              <a:t>Hampus Karlsson hk222gn</a:t>
+            </a:r>
+            <a:endParaRPr lang="sv-SE" dirty="0"/>
           </a:p>
         </p:txBody>
       </p:sp>

</xml_diff>